<commit_message>
Adjusted spell table column names, removed prefix from upcast_effect
Added an html to hasten viewing the adjusted data. The table won't fit in terminal so this improves workflow. Need to trim whitespace from all columns so that any future operations on the data will be much easier. Wasted a lot of time remembering that I had to do that.
</commit_message>
<xml_diff>
--- a/Spell database diagram.pptx
+++ b/Spell database diagram.pptx
@@ -259,7 +259,7 @@
           <a:p>
             <a:fld id="{2EA71DFD-377C-4EB5-BA3E-17FDF086A0CC}" type="datetimeFigureOut">
               <a:rPr lang="en-US" smtClean="0"/>
-              <a:t>5/5/2024</a:t>
+              <a:t>8/29/2024</a:t>
             </a:fld>
             <a:endParaRPr lang="en-US"/>
           </a:p>
@@ -457,7 +457,7 @@
           <a:p>
             <a:fld id="{2EA71DFD-377C-4EB5-BA3E-17FDF086A0CC}" type="datetimeFigureOut">
               <a:rPr lang="en-US" smtClean="0"/>
-              <a:t>5/5/2024</a:t>
+              <a:t>8/29/2024</a:t>
             </a:fld>
             <a:endParaRPr lang="en-US"/>
           </a:p>
@@ -665,7 +665,7 @@
           <a:p>
             <a:fld id="{2EA71DFD-377C-4EB5-BA3E-17FDF086A0CC}" type="datetimeFigureOut">
               <a:rPr lang="en-US" smtClean="0"/>
-              <a:t>5/5/2024</a:t>
+              <a:t>8/29/2024</a:t>
             </a:fld>
             <a:endParaRPr lang="en-US"/>
           </a:p>
@@ -863,7 +863,7 @@
           <a:p>
             <a:fld id="{2EA71DFD-377C-4EB5-BA3E-17FDF086A0CC}" type="datetimeFigureOut">
               <a:rPr lang="en-US" smtClean="0"/>
-              <a:t>5/5/2024</a:t>
+              <a:t>8/29/2024</a:t>
             </a:fld>
             <a:endParaRPr lang="en-US"/>
           </a:p>
@@ -1138,7 +1138,7 @@
           <a:p>
             <a:fld id="{2EA71DFD-377C-4EB5-BA3E-17FDF086A0CC}" type="datetimeFigureOut">
               <a:rPr lang="en-US" smtClean="0"/>
-              <a:t>5/5/2024</a:t>
+              <a:t>8/29/2024</a:t>
             </a:fld>
             <a:endParaRPr lang="en-US"/>
           </a:p>
@@ -1403,7 +1403,7 @@
           <a:p>
             <a:fld id="{2EA71DFD-377C-4EB5-BA3E-17FDF086A0CC}" type="datetimeFigureOut">
               <a:rPr lang="en-US" smtClean="0"/>
-              <a:t>5/5/2024</a:t>
+              <a:t>8/29/2024</a:t>
             </a:fld>
             <a:endParaRPr lang="en-US"/>
           </a:p>
@@ -1815,7 +1815,7 @@
           <a:p>
             <a:fld id="{2EA71DFD-377C-4EB5-BA3E-17FDF086A0CC}" type="datetimeFigureOut">
               <a:rPr lang="en-US" smtClean="0"/>
-              <a:t>5/5/2024</a:t>
+              <a:t>8/29/2024</a:t>
             </a:fld>
             <a:endParaRPr lang="en-US"/>
           </a:p>
@@ -1956,7 +1956,7 @@
           <a:p>
             <a:fld id="{2EA71DFD-377C-4EB5-BA3E-17FDF086A0CC}" type="datetimeFigureOut">
               <a:rPr lang="en-US" smtClean="0"/>
-              <a:t>5/5/2024</a:t>
+              <a:t>8/29/2024</a:t>
             </a:fld>
             <a:endParaRPr lang="en-US"/>
           </a:p>
@@ -2069,7 +2069,7 @@
           <a:p>
             <a:fld id="{2EA71DFD-377C-4EB5-BA3E-17FDF086A0CC}" type="datetimeFigureOut">
               <a:rPr lang="en-US" smtClean="0"/>
-              <a:t>5/5/2024</a:t>
+              <a:t>8/29/2024</a:t>
             </a:fld>
             <a:endParaRPr lang="en-US"/>
           </a:p>
@@ -2380,7 +2380,7 @@
           <a:p>
             <a:fld id="{2EA71DFD-377C-4EB5-BA3E-17FDF086A0CC}" type="datetimeFigureOut">
               <a:rPr lang="en-US" smtClean="0"/>
-              <a:t>5/5/2024</a:t>
+              <a:t>8/29/2024</a:t>
             </a:fld>
             <a:endParaRPr lang="en-US"/>
           </a:p>
@@ -2668,7 +2668,7 @@
           <a:p>
             <a:fld id="{2EA71DFD-377C-4EB5-BA3E-17FDF086A0CC}" type="datetimeFigureOut">
               <a:rPr lang="en-US" smtClean="0"/>
-              <a:t>5/5/2024</a:t>
+              <a:t>8/29/2024</a:t>
             </a:fld>
             <a:endParaRPr lang="en-US"/>
           </a:p>
@@ -2909,7 +2909,7 @@
           <a:p>
             <a:fld id="{2EA71DFD-377C-4EB5-BA3E-17FDF086A0CC}" type="datetimeFigureOut">
               <a:rPr lang="en-US" smtClean="0"/>
-              <a:t>5/5/2024</a:t>
+              <a:t>8/29/2024</a:t>
             </a:fld>
             <a:endParaRPr lang="en-US"/>
           </a:p>
@@ -3341,7 +3341,7 @@
           <p:nvPr>
             <p:extLst>
               <p:ext uri="{D42A27DB-BD31-4B8C-83A1-F6EECF244321}">
-                <p14:modId xmlns:p14="http://schemas.microsoft.com/office/powerpoint/2010/main" val="2611338836"/>
+                <p14:modId xmlns:p14="http://schemas.microsoft.com/office/powerpoint/2010/main" val="2075557853"/>
               </p:ext>
             </p:extLst>
           </p:nvPr>
@@ -3461,7 +3461,7 @@
                       </a:r>
                       <a:r>
                         <a:rPr lang="en-US" sz="1200" dirty="0"/>
-                        <a:t> STRING NOT NULL</a:t>
+                        <a:t> TEXT NOT NULL</a:t>
                       </a:r>
                     </a:p>
                   </a:txBody>
@@ -3555,7 +3555,7 @@
                     <a:p>
                       <a:r>
                         <a:rPr lang="en-US" sz="1200" dirty="0"/>
-                        <a:t>description BLOB NOT NULL</a:t>
+                        <a:t>description TEXT NOT NULL</a:t>
                       </a:r>
                     </a:p>
                   </a:txBody>
@@ -3704,12 +3704,8 @@
                     <a:lstStyle/>
                     <a:p>
                       <a:r>
-                        <a:rPr lang="en-US" sz="1200" dirty="0" err="1"/>
-                        <a:t>has_concentration</a:t>
-                      </a:r>
-                      <a:r>
                         <a:rPr lang="en-US" sz="1200" dirty="0"/>
-                        <a:t> BOOLEAN NOT NULL</a:t>
+                        <a:t>concentration BOOLEAN NOT NULL</a:t>
                       </a:r>
                     </a:p>
                   </a:txBody>
@@ -3738,12 +3734,8 @@
                     <a:lstStyle/>
                     <a:p>
                       <a:r>
-                        <a:rPr lang="en-US" sz="1200" dirty="0" err="1"/>
-                        <a:t>Is_ritual</a:t>
-                      </a:r>
-                      <a:r>
                         <a:rPr lang="en-US" sz="1200" dirty="0"/>
-                        <a:t> BOOLEAN NOT NULL</a:t>
+                        <a:t>ritual BOOLEAN NOT NULL</a:t>
                       </a:r>
                     </a:p>
                   </a:txBody>
@@ -3807,11 +3799,11 @@
                     <a:p>
                       <a:r>
                         <a:rPr lang="en-US" sz="1200" dirty="0" err="1"/>
-                        <a:t>has_upcast_effect</a:t>
+                        <a:t>upcast_effect</a:t>
                       </a:r>
                       <a:r>
                         <a:rPr lang="en-US" sz="1200" dirty="0"/>
-                        <a:t> BOOLEAN NOT NULL</a:t>
+                        <a:t> TEXT</a:t>
                       </a:r>
                     </a:p>
                   </a:txBody>
@@ -3842,14 +3834,14 @@
           <p:nvPr>
             <p:extLst>
               <p:ext uri="{D42A27DB-BD31-4B8C-83A1-F6EECF244321}">
-                <p14:modId xmlns:p14="http://schemas.microsoft.com/office/powerpoint/2010/main" val="1216444242"/>
+                <p14:modId xmlns:p14="http://schemas.microsoft.com/office/powerpoint/2010/main" val="4266950432"/>
               </p:ext>
             </p:extLst>
           </p:nvPr>
         </p:nvGraphicFramePr>
         <p:xfrm>
-          <a:off x="5282283" y="1918307"/>
-          <a:ext cx="2330450" cy="853440"/>
+          <a:off x="5282282" y="1918307"/>
+          <a:ext cx="2605195" cy="853440"/>
         </p:xfrm>
         <a:graphic>
           <a:graphicData uri="http://schemas.openxmlformats.org/drawingml/2006/table">
@@ -3858,14 +3850,14 @@
                 <a:tableStyleId>{5C22544A-7EE6-4342-B048-85BDC9FD1C3A}</a:tableStyleId>
               </a:tblPr>
               <a:tblGrid>
-                <a:gridCol w="529724">
+                <a:gridCol w="592175">
                   <a:extLst>
                     <a:ext uri="{9D8B030D-6E8A-4147-A177-3AD203B41FA5}">
                       <a16:colId xmlns:a16="http://schemas.microsoft.com/office/drawing/2014/main" val="1454048853"/>
                     </a:ext>
                   </a:extLst>
                 </a:gridCol>
-                <a:gridCol w="1800726">
+                <a:gridCol w="2013020">
                   <a:extLst>
                     <a:ext uri="{9D8B030D-6E8A-4147-A177-3AD203B41FA5}">
                       <a16:colId xmlns:a16="http://schemas.microsoft.com/office/drawing/2014/main" val="3290258725"/>
@@ -3923,8 +3915,12 @@
                     <a:lstStyle/>
                     <a:p>
                       <a:r>
+                        <a:rPr lang="en-US" sz="1200" dirty="0" err="1"/>
+                        <a:t>fusion_id</a:t>
+                      </a:r>
+                      <a:r>
                         <a:rPr lang="en-US" sz="1200" dirty="0"/>
-                        <a:t>fusion ID INT NOT NULL</a:t>
+                        <a:t> INT NOT NULL</a:t>
                       </a:r>
                     </a:p>
                   </a:txBody>
@@ -3954,7 +3950,7 @@
                     <a:p>
                       <a:r>
                         <a:rPr lang="en-US" sz="1200" dirty="0"/>
-                        <a:t>effect BLOB NOT NULL</a:t>
+                        <a:t>effect TEXT NOT NULL</a:t>
                       </a:r>
                     </a:p>
                   </a:txBody>
@@ -4483,19 +4479,20 @@
             </a:extLst>
           </p:cNvPr>
           <p:cNvCxnSpPr>
+            <a:cxnSpLocks/>
             <a:endCxn id="5" idx="1"/>
           </p:cNvCxnSpPr>
           <p:nvPr/>
         </p:nvCxnSpPr>
         <p:spPr>
           <a:xfrm rot="5400000">
-            <a:off x="4651334" y="1714078"/>
-            <a:ext cx="1261898" cy="12700"/>
+            <a:off x="4657685" y="1714077"/>
+            <a:ext cx="1255548" cy="6353"/>
           </a:xfrm>
           <a:prstGeom prst="bentConnector4">
             <a:avLst>
-              <a:gd name="adj1" fmla="val 1"/>
-              <a:gd name="adj2" fmla="val 3014283"/>
+              <a:gd name="adj1" fmla="val 33007"/>
+              <a:gd name="adj2" fmla="val 3698300"/>
             </a:avLst>
           </a:prstGeom>
           <a:ln>

</xml_diff>

<commit_message>
Added html table previews of tables for db
Decided to change naming of class_id to character_class_id. Decided to add html views of tables to be added to the database.
</commit_message>
<xml_diff>
--- a/Spell database diagram.pptx
+++ b/Spell database diagram.pptx
@@ -259,7 +259,7 @@
           <a:p>
             <a:fld id="{2EA71DFD-377C-4EB5-BA3E-17FDF086A0CC}" type="datetimeFigureOut">
               <a:rPr lang="en-US" smtClean="0"/>
-              <a:t>8/29/2024</a:t>
+              <a:t>8/31/2024</a:t>
             </a:fld>
             <a:endParaRPr lang="en-US"/>
           </a:p>
@@ -457,7 +457,7 @@
           <a:p>
             <a:fld id="{2EA71DFD-377C-4EB5-BA3E-17FDF086A0CC}" type="datetimeFigureOut">
               <a:rPr lang="en-US" smtClean="0"/>
-              <a:t>8/29/2024</a:t>
+              <a:t>8/31/2024</a:t>
             </a:fld>
             <a:endParaRPr lang="en-US"/>
           </a:p>
@@ -665,7 +665,7 @@
           <a:p>
             <a:fld id="{2EA71DFD-377C-4EB5-BA3E-17FDF086A0CC}" type="datetimeFigureOut">
               <a:rPr lang="en-US" smtClean="0"/>
-              <a:t>8/29/2024</a:t>
+              <a:t>8/31/2024</a:t>
             </a:fld>
             <a:endParaRPr lang="en-US"/>
           </a:p>
@@ -863,7 +863,7 @@
           <a:p>
             <a:fld id="{2EA71DFD-377C-4EB5-BA3E-17FDF086A0CC}" type="datetimeFigureOut">
               <a:rPr lang="en-US" smtClean="0"/>
-              <a:t>8/29/2024</a:t>
+              <a:t>8/31/2024</a:t>
             </a:fld>
             <a:endParaRPr lang="en-US"/>
           </a:p>
@@ -1138,7 +1138,7 @@
           <a:p>
             <a:fld id="{2EA71DFD-377C-4EB5-BA3E-17FDF086A0CC}" type="datetimeFigureOut">
               <a:rPr lang="en-US" smtClean="0"/>
-              <a:t>8/29/2024</a:t>
+              <a:t>8/31/2024</a:t>
             </a:fld>
             <a:endParaRPr lang="en-US"/>
           </a:p>
@@ -1403,7 +1403,7 @@
           <a:p>
             <a:fld id="{2EA71DFD-377C-4EB5-BA3E-17FDF086A0CC}" type="datetimeFigureOut">
               <a:rPr lang="en-US" smtClean="0"/>
-              <a:t>8/29/2024</a:t>
+              <a:t>8/31/2024</a:t>
             </a:fld>
             <a:endParaRPr lang="en-US"/>
           </a:p>
@@ -1815,7 +1815,7 @@
           <a:p>
             <a:fld id="{2EA71DFD-377C-4EB5-BA3E-17FDF086A0CC}" type="datetimeFigureOut">
               <a:rPr lang="en-US" smtClean="0"/>
-              <a:t>8/29/2024</a:t>
+              <a:t>8/31/2024</a:t>
             </a:fld>
             <a:endParaRPr lang="en-US"/>
           </a:p>
@@ -1956,7 +1956,7 @@
           <a:p>
             <a:fld id="{2EA71DFD-377C-4EB5-BA3E-17FDF086A0CC}" type="datetimeFigureOut">
               <a:rPr lang="en-US" smtClean="0"/>
-              <a:t>8/29/2024</a:t>
+              <a:t>8/31/2024</a:t>
             </a:fld>
             <a:endParaRPr lang="en-US"/>
           </a:p>
@@ -2069,7 +2069,7 @@
           <a:p>
             <a:fld id="{2EA71DFD-377C-4EB5-BA3E-17FDF086A0CC}" type="datetimeFigureOut">
               <a:rPr lang="en-US" smtClean="0"/>
-              <a:t>8/29/2024</a:t>
+              <a:t>8/31/2024</a:t>
             </a:fld>
             <a:endParaRPr lang="en-US"/>
           </a:p>
@@ -2380,7 +2380,7 @@
           <a:p>
             <a:fld id="{2EA71DFD-377C-4EB5-BA3E-17FDF086A0CC}" type="datetimeFigureOut">
               <a:rPr lang="en-US" smtClean="0"/>
-              <a:t>8/29/2024</a:t>
+              <a:t>8/31/2024</a:t>
             </a:fld>
             <a:endParaRPr lang="en-US"/>
           </a:p>
@@ -2668,7 +2668,7 @@
           <a:p>
             <a:fld id="{2EA71DFD-377C-4EB5-BA3E-17FDF086A0CC}" type="datetimeFigureOut">
               <a:rPr lang="en-US" smtClean="0"/>
-              <a:t>8/29/2024</a:t>
+              <a:t>8/31/2024</a:t>
             </a:fld>
             <a:endParaRPr lang="en-US"/>
           </a:p>
@@ -2909,7 +2909,7 @@
           <a:p>
             <a:fld id="{2EA71DFD-377C-4EB5-BA3E-17FDF086A0CC}" type="datetimeFigureOut">
               <a:rPr lang="en-US" smtClean="0"/>
-              <a:t>8/29/2024</a:t>
+              <a:t>8/31/2024</a:t>
             </a:fld>
             <a:endParaRPr lang="en-US"/>
           </a:p>
@@ -3981,14 +3981,14 @@
           <p:nvPr>
             <p:extLst>
               <p:ext uri="{D42A27DB-BD31-4B8C-83A1-F6EECF244321}">
-                <p14:modId xmlns:p14="http://schemas.microsoft.com/office/powerpoint/2010/main" val="304279581"/>
+                <p14:modId xmlns:p14="http://schemas.microsoft.com/office/powerpoint/2010/main" val="537924348"/>
               </p:ext>
             </p:extLst>
           </p:nvPr>
         </p:nvGraphicFramePr>
         <p:xfrm>
-          <a:off x="1263650" y="5699017"/>
-          <a:ext cx="2235200" cy="853440"/>
+          <a:off x="1263649" y="5699017"/>
+          <a:ext cx="3172883" cy="853440"/>
         </p:xfrm>
         <a:graphic>
           <a:graphicData uri="http://schemas.openxmlformats.org/drawingml/2006/table">
@@ -3997,14 +3997,14 @@
                 <a:tableStyleId>{5C22544A-7EE6-4342-B048-85BDC9FD1C3A}</a:tableStyleId>
               </a:tblPr>
               <a:tblGrid>
-                <a:gridCol w="508073">
+                <a:gridCol w="721213">
                   <a:extLst>
                     <a:ext uri="{9D8B030D-6E8A-4147-A177-3AD203B41FA5}">
                       <a16:colId xmlns:a16="http://schemas.microsoft.com/office/drawing/2014/main" val="1454048853"/>
                     </a:ext>
                   </a:extLst>
                 </a:gridCol>
-                <a:gridCol w="1727127">
+                <a:gridCol w="2451670">
                   <a:extLst>
                     <a:ext uri="{9D8B030D-6E8A-4147-A177-3AD203B41FA5}">
                       <a16:colId xmlns:a16="http://schemas.microsoft.com/office/drawing/2014/main" val="3290258725"/>
@@ -4063,7 +4063,7 @@
                     <a:p>
                       <a:r>
                         <a:rPr lang="en-US" sz="1200" dirty="0" err="1"/>
-                        <a:t>class_id</a:t>
+                        <a:t>character_class_id</a:t>
                       </a:r>
                       <a:r>
                         <a:rPr lang="en-US" sz="1200" dirty="0"/>
@@ -4096,8 +4096,12 @@
                     <a:lstStyle/>
                     <a:p>
                       <a:r>
+                        <a:rPr lang="en-US" sz="1200" dirty="0" err="1"/>
+                        <a:t>character_class</a:t>
+                      </a:r>
+                      <a:r>
                         <a:rPr lang="en-US" sz="1200" dirty="0"/>
-                        <a:t>class TEXT NOT NULL</a:t>
+                        <a:t> TEXT NOT NULL</a:t>
                       </a:r>
                     </a:p>
                   </a:txBody>
@@ -4440,13 +4444,13 @@
         </p:nvCxnSpPr>
         <p:spPr>
           <a:xfrm rot="5400000">
-            <a:off x="840400" y="5702484"/>
-            <a:ext cx="846503" cy="2"/>
+            <a:off x="840405" y="5702479"/>
+            <a:ext cx="846503" cy="13"/>
           </a:xfrm>
           <a:prstGeom prst="bentConnector4">
             <a:avLst>
-              <a:gd name="adj1" fmla="val -522"/>
-              <a:gd name="adj2" fmla="val 11430100000"/>
+              <a:gd name="adj1" fmla="val 789"/>
+              <a:gd name="adj2" fmla="val 1758561538"/>
             </a:avLst>
           </a:prstGeom>
           <a:ln>
@@ -4491,7 +4495,7 @@
           </a:xfrm>
           <a:prstGeom prst="bentConnector4">
             <a:avLst>
-              <a:gd name="adj1" fmla="val 33007"/>
+              <a:gd name="adj1" fmla="val -36"/>
               <a:gd name="adj2" fmla="val 3698300"/>
             </a:avLst>
           </a:prstGeom>

</xml_diff>